<commit_message>
change transitions to fade
</commit_message>
<xml_diff>
--- a/weather-forecast/notes/Project-presentation.pptx
+++ b/weather-forecast/notes/Project-presentation.pptx
@@ -5789,13 +5789,13 @@
   <p:clrMapOvr>
     <a:masterClrMapping/>
   </p:clrMapOvr>
-  <mc:AlternateContent xmlns:mc="http://schemas.openxmlformats.org/markup-compatibility/2006">
-    <mc:Choice xmlns:p14="http://schemas.microsoft.com/office/powerpoint/2010/main" Requires="p14">
+  <mc:AlternateContent xmlns:mc="http://schemas.openxmlformats.org/markup-compatibility/2006" xmlns:p14="http://schemas.microsoft.com/office/powerpoint/2010/main">
+    <mc:Choice Requires="p14">
       <p:transition spd="slow">
         <p14:reveal/>
       </p:transition>
     </mc:Choice>
-    <mc:Fallback>
+    <mc:Fallback xmlns="">
       <p:transition spd="slow">
         <p:fade/>
       </p:transition>
@@ -5888,7 +5888,7 @@
     <a:masterClrMapping/>
   </p:clrMapOvr>
   <p:transition spd="slow">
-    <p:randomBar dir="vert"/>
+    <p:wipe/>
   </p:transition>
 </p:sld>
 </file>
@@ -5995,7 +5995,7 @@
     <a:masterClrMapping/>
   </p:clrMapOvr>
   <p:transition spd="slow">
-    <p:randomBar dir="vert"/>
+    <p:wipe/>
   </p:transition>
 </p:sld>
 </file>

</xml_diff>

<commit_message>
changed transition to blinds
</commit_message>
<xml_diff>
--- a/weather-forecast/notes/Project-presentation.pptx
+++ b/weather-forecast/notes/Project-presentation.pptx
@@ -5887,9 +5887,18 @@
   <p:clrMapOvr>
     <a:masterClrMapping/>
   </p:clrMapOvr>
-  <p:transition spd="slow">
-    <p:wipe/>
-  </p:transition>
+  <mc:AlternateContent xmlns:mc="http://schemas.openxmlformats.org/markup-compatibility/2006">
+    <mc:Choice xmlns:p14="http://schemas.microsoft.com/office/powerpoint/2010/main" Requires="p14">
+      <p:transition spd="slow" p14:dur="1600">
+        <p:blinds dir="vert"/>
+      </p:transition>
+    </mc:Choice>
+    <mc:Fallback>
+      <p:transition spd="slow">
+        <p:blinds dir="vert"/>
+      </p:transition>
+    </mc:Fallback>
+  </mc:AlternateContent>
 </p:sld>
 </file>
 
@@ -5994,9 +6003,18 @@
   <p:clrMapOvr>
     <a:masterClrMapping/>
   </p:clrMapOvr>
-  <p:transition spd="slow">
-    <p:wipe/>
-  </p:transition>
+  <mc:AlternateContent xmlns:mc="http://schemas.openxmlformats.org/markup-compatibility/2006">
+    <mc:Choice xmlns:p14="http://schemas.microsoft.com/office/powerpoint/2010/main" Requires="p14">
+      <p:transition spd="slow" p14:dur="1600">
+        <p:blinds dir="vert"/>
+      </p:transition>
+    </mc:Choice>
+    <mc:Fallback>
+      <p:transition spd="slow">
+        <p:blinds dir="vert"/>
+      </p:transition>
+    </mc:Fallback>
+  </mc:AlternateContent>
 </p:sld>
 </file>
 

</xml_diff>